<commit_message>
Adding links for youtube video in report
</commit_message>
<xml_diff>
--- a/documentation/Fall2022/EventNXT-Poster.pptx
+++ b/documentation/Fall2022/EventNXT-Poster.pptx
@@ -266,7 +266,7 @@
 <file path=ppt/revisionInfo.xml><?xml version="1.0" encoding="utf-8"?>
 <p1510:revInfo xmlns:a="http://schemas.openxmlformats.org/drawingml/2006/main" xmlns:r="http://schemas.openxmlformats.org/officeDocument/2006/relationships" xmlns:p1510="http://schemas.microsoft.com/office/powerpoint/2015/10/main">
   <p1510:revLst>
-    <p1510:client id="{8ED68BFC-78F8-4465-89B9-D2F940AAB417}" v="619" dt="2022-12-10T01:30:57.156"/>
+    <p1510:client id="{8ED68BFC-78F8-4465-89B9-D2F940AAB417}" v="640" dt="2022-12-10T03:34:24.565"/>
   </p1510:revLst>
 </p1510:revInfo>
 </file>
@@ -276,12 +276,12 @@
   <pc:docChgLst>
     <pc:chgData name="aishwarya v" userId="584d83f4ac2aec9d" providerId="LiveId" clId="{8ED68BFC-78F8-4465-89B9-D2F940AAB417}"/>
     <pc:docChg chg="undo custSel addSld delSld modSld">
-      <pc:chgData name="aishwarya v" userId="584d83f4ac2aec9d" providerId="LiveId" clId="{8ED68BFC-78F8-4465-89B9-D2F940AAB417}" dt="2022-12-10T01:33:18.677" v="5039" actId="478"/>
+      <pc:chgData name="aishwarya v" userId="584d83f4ac2aec9d" providerId="LiveId" clId="{8ED68BFC-78F8-4465-89B9-D2F940AAB417}" dt="2022-12-10T03:34:26.585" v="5064" actId="478"/>
       <pc:docMkLst>
         <pc:docMk/>
       </pc:docMkLst>
-      <pc:sldChg chg="addSp delSp modSp mod modTransition delAnim modAnim">
-        <pc:chgData name="aishwarya v" userId="584d83f4ac2aec9d" providerId="LiveId" clId="{8ED68BFC-78F8-4465-89B9-D2F940AAB417}" dt="2022-12-10T01:33:18.677" v="5039" actId="478"/>
+      <pc:sldChg chg="addSp delSp modSp mod modTransition addAnim delAnim modAnim">
+        <pc:chgData name="aishwarya v" userId="584d83f4ac2aec9d" providerId="LiveId" clId="{8ED68BFC-78F8-4465-89B9-D2F940AAB417}" dt="2022-12-10T03:34:26.585" v="5064" actId="478"/>
         <pc:sldMkLst>
           <pc:docMk/>
           <pc:sldMk cId="0" sldId="256"/>
@@ -350,6 +350,86 @@
             <ac:spMk id="94" creationId="{00000000-0000-0000-0000-000000000000}"/>
           </ac:spMkLst>
         </pc:spChg>
+        <pc:picChg chg="add del mod">
+          <ac:chgData name="aishwarya v" userId="584d83f4ac2aec9d" providerId="LiveId" clId="{8ED68BFC-78F8-4465-89B9-D2F940AAB417}" dt="2022-12-10T03:02:08.150" v="5052" actId="478"/>
+          <ac:picMkLst>
+            <pc:docMk/>
+            <pc:sldMk cId="0" sldId="256"/>
+            <ac:picMk id="6" creationId="{3ED5928F-ED94-9226-7436-C7E6AF7F50EF}"/>
+          </ac:picMkLst>
+        </pc:picChg>
+        <pc:picChg chg="add del mod">
+          <ac:chgData name="aishwarya v" userId="584d83f4ac2aec9d" providerId="LiveId" clId="{8ED68BFC-78F8-4465-89B9-D2F940AAB417}" dt="2022-12-10T02:29:53.824" v="5050" actId="478"/>
+          <ac:picMkLst>
+            <pc:docMk/>
+            <pc:sldMk cId="0" sldId="256"/>
+            <ac:picMk id="6" creationId="{5E4092E6-A5AA-A654-C3FA-932ABA10681F}"/>
+          </ac:picMkLst>
+        </pc:picChg>
+        <pc:picChg chg="add del mod">
+          <ac:chgData name="aishwarya v" userId="584d83f4ac2aec9d" providerId="LiveId" clId="{8ED68BFC-78F8-4465-89B9-D2F940AAB417}" dt="2022-12-10T02:14:42.279" v="5041" actId="478"/>
+          <ac:picMkLst>
+            <pc:docMk/>
+            <pc:sldMk cId="0" sldId="256"/>
+            <ac:picMk id="6" creationId="{61EE360E-E592-0EF4-0C69-C44C3F42E98F}"/>
+          </ac:picMkLst>
+        </pc:picChg>
+        <pc:picChg chg="add del mod">
+          <ac:chgData name="aishwarya v" userId="584d83f4ac2aec9d" providerId="LiveId" clId="{8ED68BFC-78F8-4465-89B9-D2F940AAB417}" dt="2022-12-10T03:27:40.937" v="5060" actId="478"/>
+          <ac:picMkLst>
+            <pc:docMk/>
+            <pc:sldMk cId="0" sldId="256"/>
+            <ac:picMk id="6" creationId="{772A5734-6306-8F80-3BF5-201F9F63431A}"/>
+          </ac:picMkLst>
+        </pc:picChg>
+        <pc:picChg chg="add del mod">
+          <ac:chgData name="aishwarya v" userId="584d83f4ac2aec9d" providerId="LiveId" clId="{8ED68BFC-78F8-4465-89B9-D2F940AAB417}" dt="2022-12-10T03:05:38.016" v="5058" actId="478"/>
+          <ac:picMkLst>
+            <pc:docMk/>
+            <pc:sldMk cId="0" sldId="256"/>
+            <ac:picMk id="6" creationId="{95E40AD1-5587-A9B6-6938-2D7877AF9C9D}"/>
+          </ac:picMkLst>
+        </pc:picChg>
+        <pc:picChg chg="add del mod">
+          <ac:chgData name="aishwarya v" userId="584d83f4ac2aec9d" providerId="LiveId" clId="{8ED68BFC-78F8-4465-89B9-D2F940AAB417}" dt="2022-12-10T03:34:26.585" v="5064" actId="478"/>
+          <ac:picMkLst>
+            <pc:docMk/>
+            <pc:sldMk cId="0" sldId="256"/>
+            <ac:picMk id="6" creationId="{C7FF8BEA-12FC-1E0C-BB95-0DE9DD599A22}"/>
+          </ac:picMkLst>
+        </pc:picChg>
+        <pc:picChg chg="add del mod">
+          <ac:chgData name="aishwarya v" userId="584d83f4ac2aec9d" providerId="LiveId" clId="{8ED68BFC-78F8-4465-89B9-D2F940AAB417}" dt="2022-12-10T03:02:51.221" v="5054" actId="478"/>
+          <ac:picMkLst>
+            <pc:docMk/>
+            <pc:sldMk cId="0" sldId="256"/>
+            <ac:picMk id="6" creationId="{FBE19303-8849-2F89-CCEA-B41ED9EC1C77}"/>
+          </ac:picMkLst>
+        </pc:picChg>
+        <pc:picChg chg="add del mod">
+          <ac:chgData name="aishwarya v" userId="584d83f4ac2aec9d" providerId="LiveId" clId="{8ED68BFC-78F8-4465-89B9-D2F940AAB417}" dt="2022-12-10T03:28:26.063" v="5062" actId="478"/>
+          <ac:picMkLst>
+            <pc:docMk/>
+            <pc:sldMk cId="0" sldId="256"/>
+            <ac:picMk id="7" creationId="{4F1762C9-C2C7-DEFD-32A1-49D954E3DB06}"/>
+          </ac:picMkLst>
+        </pc:picChg>
+        <pc:picChg chg="add del mod">
+          <ac:chgData name="aishwarya v" userId="584d83f4ac2aec9d" providerId="LiveId" clId="{8ED68BFC-78F8-4465-89B9-D2F940AAB417}" dt="2022-12-10T02:16:56.708" v="5043" actId="478"/>
+          <ac:picMkLst>
+            <pc:docMk/>
+            <pc:sldMk cId="0" sldId="256"/>
+            <ac:picMk id="7" creationId="{736406C7-9FB0-4760-F512-6BCC6C4FC1E4}"/>
+          </ac:picMkLst>
+        </pc:picChg>
+        <pc:picChg chg="add del mod">
+          <ac:chgData name="aishwarya v" userId="584d83f4ac2aec9d" providerId="LiveId" clId="{8ED68BFC-78F8-4465-89B9-D2F940AAB417}" dt="2022-12-10T03:03:24.641" v="5056" actId="478"/>
+          <ac:picMkLst>
+            <pc:docMk/>
+            <pc:sldMk cId="0" sldId="256"/>
+            <ac:picMk id="7" creationId="{95E9DD36-1821-E8C4-A770-B1C06E4C4CF7}"/>
+          </ac:picMkLst>
+        </pc:picChg>
         <pc:picChg chg="add del mod">
           <ac:chgData name="aishwarya v" userId="584d83f4ac2aec9d" providerId="LiveId" clId="{8ED68BFC-78F8-4465-89B9-D2F940AAB417}" dt="2022-12-10T01:30:00.437" v="5034" actId="478"/>
           <ac:picMkLst>
@@ -1706,7 +1786,7 @@
         </pc:picChg>
       </pc:sldChg>
       <pc:sldChg chg="addSp delSp modSp add mod">
-        <pc:chgData name="aishwarya v" userId="584d83f4ac2aec9d" providerId="LiveId" clId="{8ED68BFC-78F8-4465-89B9-D2F940AAB417}" dt="2022-12-09T23:43:38.289" v="5028" actId="20577"/>
+        <pc:chgData name="aishwarya v" userId="584d83f4ac2aec9d" providerId="LiveId" clId="{8ED68BFC-78F8-4465-89B9-D2F940AAB417}" dt="2022-12-10T02:23:41.318" v="5047" actId="20577"/>
         <pc:sldMkLst>
           <pc:docMk/>
           <pc:sldMk cId="477304820" sldId="269"/>
@@ -1752,7 +1832,7 @@
           </ac:spMkLst>
         </pc:spChg>
         <pc:spChg chg="add mod">
-          <ac:chgData name="aishwarya v" userId="584d83f4ac2aec9d" providerId="LiveId" clId="{8ED68BFC-78F8-4465-89B9-D2F940AAB417}" dt="2022-12-09T23:42:55.735" v="5024" actId="2710"/>
+          <ac:chgData name="aishwarya v" userId="584d83f4ac2aec9d" providerId="LiveId" clId="{8ED68BFC-78F8-4465-89B9-D2F940AAB417}" dt="2022-12-10T02:23:41.318" v="5047" actId="20577"/>
           <ac:spMkLst>
             <pc:docMk/>
             <pc:sldMk cId="477304820" sldId="269"/>
@@ -15318,7 +15398,7 @@
                 <a:latin typeface="Calibri" panose="020F0502020204030204" pitchFamily="34" charset="0"/>
                 <a:cs typeface="Calibri" panose="020F0502020204030204" pitchFamily="34" charset="0"/>
               </a:rPr>
-              <a:t>Loading Box Office data on UI was one of the important features of the tool in which we faced challenges as it we had to use a spreadsheet that was generated via a third-party application.</a:t>
+              <a:t>Loading Box Office data on UI was one of the important features of the tool in which we faced challenges as we had to use a spreadsheet that was generated via a third-party application.</a:t>
             </a:r>
           </a:p>
           <a:p>

</xml_diff>